<commit_message>
Finished the presentation and added video to the exam folder
</commit_message>
<xml_diff>
--- a/Exam/Presentation_INF200.pptx
+++ b/Exam/Presentation_INF200.pptx
@@ -5,7 +5,7 @@
     <p:sldMasterId id="2147483706" r:id="rId1"/>
   </p:sldMasterIdLst>
   <p:notesMasterIdLst>
-    <p:notesMasterId r:id="rId11"/>
+    <p:notesMasterId r:id="rId12"/>
   </p:notesMasterIdLst>
   <p:sldIdLst>
     <p:sldId id="261" r:id="rId2"/>
@@ -16,7 +16,8 @@
     <p:sldId id="271" r:id="rId7"/>
     <p:sldId id="269" r:id="rId8"/>
     <p:sldId id="270" r:id="rId9"/>
-    <p:sldId id="260" r:id="rId10"/>
+    <p:sldId id="272" r:id="rId10"/>
+    <p:sldId id="260" r:id="rId11"/>
   </p:sldIdLst>
   <p:sldSz cx="12192000" cy="6858000"/>
   <p:notesSz cx="6797675" cy="9926638"/>
@@ -216,7 +217,7 @@
           <a:p>
             <a:fld id="{EBB013BB-223A-4A7A-A9B6-504A14290792}" type="datetimeFigureOut">
               <a:rPr lang="nb-NO" smtClean="0"/>
-              <a:t>19.06.2020</a:t>
+              <a:t>20.06.2020</a:t>
             </a:fld>
             <a:endParaRPr lang="nb-NO"/>
           </a:p>
@@ -3030,6 +3031,83 @@
 </p:sld>
 </file>
 
+<file path=ppt/slides/slide10.xml><?xml version="1.0" encoding="utf-8"?>
+<p:sld xmlns:a="http://schemas.openxmlformats.org/drawingml/2006/main" xmlns:r="http://schemas.openxmlformats.org/officeDocument/2006/relationships" xmlns:p="http://schemas.openxmlformats.org/presentationml/2006/main">
+  <p:cSld>
+    <p:spTree>
+      <p:nvGrpSpPr>
+        <p:cNvPr id="1" name=""/>
+        <p:cNvGrpSpPr/>
+        <p:nvPr/>
+      </p:nvGrpSpPr>
+      <p:grpSpPr>
+        <a:xfrm>
+          <a:off x="0" y="0"/>
+          <a:ext cx="0" cy="0"/>
+          <a:chOff x="0" y="0"/>
+          <a:chExt cx="0" cy="0"/>
+        </a:xfrm>
+      </p:grpSpPr>
+      <p:sp>
+        <p:nvSpPr>
+          <p:cNvPr id="4" name="Tittel 3"/>
+          <p:cNvSpPr>
+            <a:spLocks noGrp="1"/>
+          </p:cNvSpPr>
+          <p:nvPr>
+            <p:ph type="ctrTitle"/>
+          </p:nvPr>
+        </p:nvSpPr>
+        <p:spPr/>
+        <p:txBody>
+          <a:bodyPr/>
+          <a:lstStyle/>
+          <a:p>
+            <a:r>
+              <a:rPr lang="nb-NO" dirty="0" err="1"/>
+              <a:t>Thank</a:t>
+            </a:r>
+            <a:r>
+              <a:rPr lang="nb-NO" dirty="0"/>
+              <a:t> </a:t>
+            </a:r>
+            <a:r>
+              <a:rPr lang="nb-NO" dirty="0" err="1"/>
+              <a:t>you</a:t>
+            </a:r>
+            <a:r>
+              <a:rPr lang="nb-NO" dirty="0"/>
+              <a:t> for </a:t>
+            </a:r>
+            <a:r>
+              <a:rPr lang="nb-NO" dirty="0" err="1"/>
+              <a:t>your</a:t>
+            </a:r>
+            <a:r>
+              <a:rPr lang="nb-NO" dirty="0"/>
+              <a:t> </a:t>
+            </a:r>
+            <a:r>
+              <a:rPr lang="nb-NO" dirty="0" err="1"/>
+              <a:t>attention</a:t>
+            </a:r>
+            <a:endParaRPr lang="nb-NO" dirty="0"/>
+          </a:p>
+        </p:txBody>
+      </p:sp>
+    </p:spTree>
+    <p:extLst>
+      <p:ext uri="{BB962C8B-B14F-4D97-AF65-F5344CB8AC3E}">
+        <p14:creationId xmlns:p14="http://schemas.microsoft.com/office/powerpoint/2010/main" val="68500765"/>
+      </p:ext>
+    </p:extLst>
+  </p:cSld>
+  <p:clrMapOvr>
+    <a:masterClrMapping/>
+  </p:clrMapOvr>
+</p:sld>
+</file>
+
 <file path=ppt/slides/slide2.xml><?xml version="1.0" encoding="utf-8"?>
 <p:sld xmlns:a="http://schemas.openxmlformats.org/drawingml/2006/main" xmlns:r="http://schemas.openxmlformats.org/officeDocument/2006/relationships" xmlns:p="http://schemas.openxmlformats.org/presentationml/2006/main">
   <p:cSld>
@@ -4619,7 +4697,12 @@
             <p:ph idx="10"/>
           </p:nvPr>
         </p:nvSpPr>
-        <p:spPr/>
+        <p:spPr>
+          <a:xfrm>
+            <a:off x="696374" y="1800000"/>
+            <a:ext cx="5399625" cy="4365000"/>
+          </a:xfrm>
+        </p:spPr>
         <p:txBody>
           <a:bodyPr/>
           <a:lstStyle/>
@@ -4798,21 +4881,82 @@
             </a:r>
             <a:r>
               <a:rPr lang="nb-NO" dirty="0"/>
-              <a:t>.</a:t>
-            </a:r>
-          </a:p>
-          <a:p>
-            <a:r>
-              <a:rPr lang="nb-NO" dirty="0"/>
-              <a:t>The </a:t>
-            </a:r>
-            <a:r>
-              <a:rPr lang="nb-NO" dirty="0" err="1"/>
-              <a:t>our</a:t>
-            </a:r>
-            <a:r>
-              <a:rPr lang="nb-NO" dirty="0"/>
-              <a:t> tests cover most of </a:t>
+              <a:t>. </a:t>
+            </a:r>
+            <a:r>
+              <a:rPr lang="nb-NO" dirty="0" err="1"/>
+              <a:t>We</a:t>
+            </a:r>
+            <a:r>
+              <a:rPr lang="nb-NO" dirty="0"/>
+              <a:t> used </a:t>
+            </a:r>
+            <a:r>
+              <a:rPr lang="nb-NO" dirty="0" err="1"/>
+              <a:t>kanban</a:t>
+            </a:r>
+            <a:r>
+              <a:rPr lang="nb-NO" dirty="0"/>
+              <a:t> </a:t>
+            </a:r>
+            <a:r>
+              <a:rPr lang="nb-NO" dirty="0" err="1"/>
+              <a:t>cards</a:t>
+            </a:r>
+            <a:r>
+              <a:rPr lang="nb-NO" dirty="0"/>
+              <a:t> in </a:t>
+            </a:r>
+            <a:r>
+              <a:rPr lang="nb-NO" dirty="0" err="1"/>
+              <a:t>Github</a:t>
+            </a:r>
+            <a:r>
+              <a:rPr lang="nb-NO" dirty="0"/>
+              <a:t> to list </a:t>
+            </a:r>
+            <a:r>
+              <a:rPr lang="nb-NO" dirty="0" err="1"/>
+              <a:t>issues</a:t>
+            </a:r>
+            <a:r>
+              <a:rPr lang="nb-NO" dirty="0"/>
+              <a:t> </a:t>
+            </a:r>
+            <a:r>
+              <a:rPr lang="nb-NO" dirty="0" err="1"/>
+              <a:t>describing</a:t>
+            </a:r>
+            <a:r>
+              <a:rPr lang="nb-NO" dirty="0"/>
+              <a:t> </a:t>
+            </a:r>
+            <a:r>
+              <a:rPr lang="nb-NO" dirty="0" err="1"/>
+              <a:t>the</a:t>
+            </a:r>
+            <a:r>
+              <a:rPr lang="nb-NO" dirty="0"/>
+              <a:t> problems and </a:t>
+            </a:r>
+            <a:r>
+              <a:rPr lang="nb-NO" dirty="0" err="1"/>
+              <a:t>programmed</a:t>
+            </a:r>
+            <a:r>
+              <a:rPr lang="nb-NO" dirty="0"/>
+              <a:t> </a:t>
+            </a:r>
+            <a:r>
+              <a:rPr lang="nb-NO" dirty="0" err="1"/>
+              <a:t>parallely</a:t>
+            </a:r>
+            <a:endParaRPr lang="nb-NO" dirty="0"/>
+          </a:p>
+          <a:p>
+            <a:r>
+              <a:rPr lang="nb-NO" dirty="0"/>
+              <a:t>Our tests cover most of </a:t>
             </a:r>
             <a:r>
               <a:rPr lang="nb-NO" dirty="0" err="1"/>
@@ -5253,7 +5397,15 @@
             </a:r>
             <a:r>
               <a:rPr lang="nb-NO" sz="1800" dirty="0"/>
-              <a:t> and understand, </a:t>
+              <a:t> and </a:t>
+            </a:r>
+            <a:r>
+              <a:rPr lang="nb-NO" sz="1800" dirty="0" err="1"/>
+              <a:t>understandable</a:t>
+            </a:r>
+            <a:r>
+              <a:rPr lang="nb-NO" sz="1800" dirty="0"/>
+              <a:t>, </a:t>
             </a:r>
             <a:r>
               <a:rPr lang="nb-NO" sz="1800" dirty="0" err="1"/>
@@ -5575,12 +5727,18 @@
       </p:grpSpPr>
       <p:sp>
         <p:nvSpPr>
-          <p:cNvPr id="4" name="Tittel 3"/>
-          <p:cNvSpPr>
-            <a:spLocks noGrp="1"/>
-          </p:cNvSpPr>
-          <p:nvPr>
-            <p:ph type="ctrTitle"/>
+          <p:cNvPr id="2" name="Plassholder for innhold 1">
+            <a:extLst>
+              <a:ext uri="{FF2B5EF4-FFF2-40B4-BE49-F238E27FC236}">
+                <a16:creationId xmlns:a16="http://schemas.microsoft.com/office/drawing/2014/main" id="{B38AE751-1F9A-416B-B809-59F75D7C6C16}"/>
+              </a:ext>
+            </a:extLst>
+          </p:cNvPr>
+          <p:cNvSpPr>
+            <a:spLocks noGrp="1"/>
+          </p:cNvSpPr>
+          <p:nvPr>
+            <p:ph idx="1"/>
           </p:nvPr>
         </p:nvSpPr>
         <p:spPr/>
@@ -5588,42 +5746,126 @@
           <a:bodyPr/>
           <a:lstStyle/>
           <a:p>
-            <a:r>
-              <a:rPr lang="nb-NO" dirty="0" err="1"/>
-              <a:t>Thank</a:t>
-            </a:r>
-            <a:r>
-              <a:rPr lang="nb-NO" dirty="0"/>
-              <a:t> </a:t>
-            </a:r>
-            <a:r>
-              <a:rPr lang="nb-NO" dirty="0" err="1"/>
-              <a:t>you</a:t>
-            </a:r>
-            <a:r>
-              <a:rPr lang="nb-NO" dirty="0"/>
-              <a:t> for </a:t>
-            </a:r>
-            <a:r>
-              <a:rPr lang="nb-NO" dirty="0" err="1"/>
-              <a:t>your</a:t>
-            </a:r>
-            <a:r>
-              <a:rPr lang="nb-NO" dirty="0"/>
-              <a:t> </a:t>
-            </a:r>
-            <a:r>
-              <a:rPr lang="nb-NO" dirty="0" err="1"/>
-              <a:t>attention</a:t>
-            </a:r>
-            <a:endParaRPr lang="nb-NO" dirty="0"/>
+            <a:endParaRPr lang="nb-NO"/>
+          </a:p>
+        </p:txBody>
+      </p:sp>
+      <p:sp>
+        <p:nvSpPr>
+          <p:cNvPr id="3" name="Plassholder for innhold 2">
+            <a:extLst>
+              <a:ext uri="{FF2B5EF4-FFF2-40B4-BE49-F238E27FC236}">
+                <a16:creationId xmlns:a16="http://schemas.microsoft.com/office/drawing/2014/main" id="{B155B483-D050-448F-8607-3C0391331925}"/>
+              </a:ext>
+            </a:extLst>
+          </p:cNvPr>
+          <p:cNvSpPr>
+            <a:spLocks noGrp="1"/>
+          </p:cNvSpPr>
+          <p:nvPr>
+            <p:ph idx="10"/>
+          </p:nvPr>
+        </p:nvSpPr>
+        <p:spPr/>
+        <p:txBody>
+          <a:bodyPr/>
+          <a:lstStyle/>
+          <a:p>
+            <a:endParaRPr lang="nb-NO"/>
+          </a:p>
+        </p:txBody>
+      </p:sp>
+      <p:sp>
+        <p:nvSpPr>
+          <p:cNvPr id="4" name="Plassholder for bunntekst 3">
+            <a:extLst>
+              <a:ext uri="{FF2B5EF4-FFF2-40B4-BE49-F238E27FC236}">
+                <a16:creationId xmlns:a16="http://schemas.microsoft.com/office/drawing/2014/main" id="{00E453BA-145F-41E4-8ED4-8328610E24AB}"/>
+              </a:ext>
+            </a:extLst>
+          </p:cNvPr>
+          <p:cNvSpPr>
+            <a:spLocks noGrp="1"/>
+          </p:cNvSpPr>
+          <p:nvPr>
+            <p:ph type="ftr" sz="quarter" idx="11"/>
+          </p:nvPr>
+        </p:nvSpPr>
+        <p:spPr/>
+        <p:txBody>
+          <a:bodyPr/>
+          <a:lstStyle/>
+          <a:p>
+            <a:r>
+              <a:rPr lang="en-US"/>
+              <a:t>Norwegian University of Life Sciences</a:t>
+            </a:r>
+            <a:endParaRPr lang="nb-NO"/>
+          </a:p>
+        </p:txBody>
+      </p:sp>
+      <p:sp>
+        <p:nvSpPr>
+          <p:cNvPr id="5" name="Plassholder for lysbildenummer 4">
+            <a:extLst>
+              <a:ext uri="{FF2B5EF4-FFF2-40B4-BE49-F238E27FC236}">
+                <a16:creationId xmlns:a16="http://schemas.microsoft.com/office/drawing/2014/main" id="{54E596A5-1ABC-4D08-8AFD-AC3B1BF6D549}"/>
+              </a:ext>
+            </a:extLst>
+          </p:cNvPr>
+          <p:cNvSpPr>
+            <a:spLocks noGrp="1"/>
+          </p:cNvSpPr>
+          <p:nvPr>
+            <p:ph type="sldNum" sz="quarter" idx="12"/>
+          </p:nvPr>
+        </p:nvSpPr>
+        <p:spPr/>
+        <p:txBody>
+          <a:bodyPr/>
+          <a:lstStyle/>
+          <a:p>
+            <a:fld id="{0A3ED7E7-E538-48B7-BF27-18C497C3E180}" type="slidenum">
+              <a:rPr lang="nb-NO" smtClean="0"/>
+              <a:pPr/>
+              <a:t>8</a:t>
+            </a:fld>
+            <a:endParaRPr lang="nb-NO"/>
+          </a:p>
+        </p:txBody>
+      </p:sp>
+      <p:sp>
+        <p:nvSpPr>
+          <p:cNvPr id="6" name="Tittel 5">
+            <a:extLst>
+              <a:ext uri="{FF2B5EF4-FFF2-40B4-BE49-F238E27FC236}">
+                <a16:creationId xmlns:a16="http://schemas.microsoft.com/office/drawing/2014/main" id="{081BA00C-ED90-479F-A884-97F0A9683BDF}"/>
+              </a:ext>
+            </a:extLst>
+          </p:cNvPr>
+          <p:cNvSpPr>
+            <a:spLocks noGrp="1"/>
+          </p:cNvSpPr>
+          <p:nvPr>
+            <p:ph type="title"/>
+          </p:nvPr>
+        </p:nvSpPr>
+        <p:spPr/>
+        <p:txBody>
+          <a:bodyPr/>
+          <a:lstStyle/>
+          <a:p>
+            <a:r>
+              <a:rPr lang="nb-NO" dirty="0"/>
+              <a:t>Play video</a:t>
+            </a:r>
           </a:p>
         </p:txBody>
       </p:sp>
     </p:spTree>
     <p:extLst>
       <p:ext uri="{BB962C8B-B14F-4D97-AF65-F5344CB8AC3E}">
-        <p14:creationId xmlns:p14="http://schemas.microsoft.com/office/powerpoint/2010/main" val="68500765"/>
+        <p14:creationId xmlns:p14="http://schemas.microsoft.com/office/powerpoint/2010/main" val="3117717389"/>
       </p:ext>
     </p:extLst>
   </p:cSld>

</xml_diff>